<commit_message>
updae slides and script to output strings
</commit_message>
<xml_diff>
--- a/slides/workshop/Workshop.pptx
+++ b/slides/workshop/Workshop.pptx
@@ -5,26 +5,28 @@
     <p:sldMasterId id="2147483648" r:id="rId1"/>
   </p:sldMasterIdLst>
   <p:notesMasterIdLst>
-    <p:notesMasterId r:id="rId4"/>
+    <p:notesMasterId r:id="rId6"/>
   </p:notesMasterIdLst>
   <p:handoutMasterIdLst>
-    <p:handoutMasterId r:id="rId5"/>
+    <p:handoutMasterId r:id="rId7"/>
   </p:handoutMasterIdLst>
   <p:sldIdLst>
     <p:sldId id="256" r:id="rId2"/>
     <p:sldId id="282" r:id="rId3"/>
+    <p:sldId id="288" r:id="rId4"/>
+    <p:sldId id="289" r:id="rId5"/>
   </p:sldIdLst>
   <p:sldSz cx="12192000" cy="6858000"/>
   <p:notesSz cx="6858000" cy="9144000"/>
   <p:embeddedFontLst>
     <p:embeddedFont>
       <p:font typeface="AA Zuehlke" panose="02000503060000020004" pitchFamily="2" charset="0"/>
-      <p:regular r:id="rId6"/>
-      <p:italic r:id="rId7"/>
+      <p:regular r:id="rId8"/>
+      <p:italic r:id="rId9"/>
     </p:embeddedFont>
   </p:embeddedFontLst>
   <p:custDataLst>
-    <p:tags r:id="rId8"/>
+    <p:tags r:id="rId10"/>
   </p:custDataLst>
   <p:defaultTextStyle>
     <a:defPPr>
@@ -309,7 +311,7 @@
               <a:rPr lang="de-DE" smtClean="0">
                 <a:latin typeface="AA Zuehlke" pitchFamily="2" charset="0"/>
               </a:rPr>
-              <a:t>15.07.2019</a:t>
+              <a:t>28.10.2019</a:t>
             </a:fld>
             <a:endParaRPr lang="de-DE" dirty="0">
               <a:latin typeface="AA Zuehlke" pitchFamily="2" charset="0"/>
@@ -487,7 +489,7 @@
             <a:fld id="{A6966AE6-B72D-4967-9CA3-8469D2863705}" type="datetimeFigureOut">
               <a:rPr lang="en-US" smtClean="0"/>
               <a:pPr/>
-              <a:t>7/15/2019</a:t>
+              <a:t>10/28/2019</a:t>
             </a:fld>
             <a:endParaRPr lang="en-US" dirty="0"/>
           </a:p>
@@ -922,6 +924,176 @@
     <p:extLst>
       <p:ext uri="{BB962C8B-B14F-4D97-AF65-F5344CB8AC3E}">
         <p14:creationId xmlns:p14="http://schemas.microsoft.com/office/powerpoint/2010/main" val="4159198875"/>
+      </p:ext>
+    </p:extLst>
+  </p:cSld>
+  <p:clrMapOvr>
+    <a:masterClrMapping/>
+  </p:clrMapOvr>
+</p:notes>
+</file>
+
+<file path=ppt/notesSlides/notesSlide3.xml><?xml version="1.0" encoding="utf-8"?>
+<p:notes xmlns:a="http://schemas.openxmlformats.org/drawingml/2006/main" xmlns:r="http://schemas.openxmlformats.org/officeDocument/2006/relationships" xmlns:p="http://schemas.openxmlformats.org/presentationml/2006/main">
+  <p:cSld>
+    <p:spTree>
+      <p:nvGrpSpPr>
+        <p:cNvPr id="1" name=""/>
+        <p:cNvGrpSpPr/>
+        <p:nvPr/>
+      </p:nvGrpSpPr>
+      <p:grpSpPr>
+        <a:xfrm>
+          <a:off x="0" y="0"/>
+          <a:ext cx="0" cy="0"/>
+          <a:chOff x="0" y="0"/>
+          <a:chExt cx="0" cy="0"/>
+        </a:xfrm>
+      </p:grpSpPr>
+      <p:sp>
+        <p:nvSpPr>
+          <p:cNvPr id="2" name="Slide Image Placeholder 1"/>
+          <p:cNvSpPr>
+            <a:spLocks noGrp="1" noRot="1" noChangeAspect="1"/>
+          </p:cNvSpPr>
+          <p:nvPr>
+            <p:ph type="sldImg"/>
+          </p:nvPr>
+        </p:nvSpPr>
+        <p:spPr/>
+      </p:sp>
+      <p:sp>
+        <p:nvSpPr>
+          <p:cNvPr id="3" name="Notes Placeholder 2"/>
+          <p:cNvSpPr>
+            <a:spLocks noGrp="1"/>
+          </p:cNvSpPr>
+          <p:nvPr>
+            <p:ph type="body" idx="1"/>
+          </p:nvPr>
+        </p:nvSpPr>
+        <p:spPr/>
+        <p:txBody>
+          <a:bodyPr/>
+          <a:lstStyle/>
+          <a:p>
+            <a:endParaRPr lang="de-DE"/>
+          </a:p>
+        </p:txBody>
+      </p:sp>
+      <p:sp>
+        <p:nvSpPr>
+          <p:cNvPr id="4" name="Slide Number Placeholder 3"/>
+          <p:cNvSpPr>
+            <a:spLocks noGrp="1"/>
+          </p:cNvSpPr>
+          <p:nvPr>
+            <p:ph type="sldNum" sz="quarter" idx="5"/>
+          </p:nvPr>
+        </p:nvSpPr>
+        <p:spPr/>
+        <p:txBody>
+          <a:bodyPr/>
+          <a:lstStyle/>
+          <a:p>
+            <a:fld id="{04E102C5-3B9C-48EE-BFF0-2E7AF2F2A1F4}" type="slidenum">
+              <a:rPr lang="en-US" smtClean="0"/>
+              <a:pPr/>
+              <a:t>3</a:t>
+            </a:fld>
+            <a:endParaRPr lang="en-US" dirty="0"/>
+          </a:p>
+        </p:txBody>
+      </p:sp>
+    </p:spTree>
+    <p:extLst>
+      <p:ext uri="{BB962C8B-B14F-4D97-AF65-F5344CB8AC3E}">
+        <p14:creationId xmlns:p14="http://schemas.microsoft.com/office/powerpoint/2010/main" val="2024405681"/>
+      </p:ext>
+    </p:extLst>
+  </p:cSld>
+  <p:clrMapOvr>
+    <a:masterClrMapping/>
+  </p:clrMapOvr>
+</p:notes>
+</file>
+
+<file path=ppt/notesSlides/notesSlide4.xml><?xml version="1.0" encoding="utf-8"?>
+<p:notes xmlns:a="http://schemas.openxmlformats.org/drawingml/2006/main" xmlns:r="http://schemas.openxmlformats.org/officeDocument/2006/relationships" xmlns:p="http://schemas.openxmlformats.org/presentationml/2006/main">
+  <p:cSld>
+    <p:spTree>
+      <p:nvGrpSpPr>
+        <p:cNvPr id="1" name=""/>
+        <p:cNvGrpSpPr/>
+        <p:nvPr/>
+      </p:nvGrpSpPr>
+      <p:grpSpPr>
+        <a:xfrm>
+          <a:off x="0" y="0"/>
+          <a:ext cx="0" cy="0"/>
+          <a:chOff x="0" y="0"/>
+          <a:chExt cx="0" cy="0"/>
+        </a:xfrm>
+      </p:grpSpPr>
+      <p:sp>
+        <p:nvSpPr>
+          <p:cNvPr id="2" name="Slide Image Placeholder 1"/>
+          <p:cNvSpPr>
+            <a:spLocks noGrp="1" noRot="1" noChangeAspect="1"/>
+          </p:cNvSpPr>
+          <p:nvPr>
+            <p:ph type="sldImg"/>
+          </p:nvPr>
+        </p:nvSpPr>
+        <p:spPr/>
+      </p:sp>
+      <p:sp>
+        <p:nvSpPr>
+          <p:cNvPr id="3" name="Notes Placeholder 2"/>
+          <p:cNvSpPr>
+            <a:spLocks noGrp="1"/>
+          </p:cNvSpPr>
+          <p:nvPr>
+            <p:ph type="body" idx="1"/>
+          </p:nvPr>
+        </p:nvSpPr>
+        <p:spPr/>
+        <p:txBody>
+          <a:bodyPr/>
+          <a:lstStyle/>
+          <a:p>
+            <a:endParaRPr lang="de-DE"/>
+          </a:p>
+        </p:txBody>
+      </p:sp>
+      <p:sp>
+        <p:nvSpPr>
+          <p:cNvPr id="4" name="Slide Number Placeholder 3"/>
+          <p:cNvSpPr>
+            <a:spLocks noGrp="1"/>
+          </p:cNvSpPr>
+          <p:nvPr>
+            <p:ph type="sldNum" sz="quarter" idx="5"/>
+          </p:nvPr>
+        </p:nvSpPr>
+        <p:spPr/>
+        <p:txBody>
+          <a:bodyPr/>
+          <a:lstStyle/>
+          <a:p>
+            <a:fld id="{04E102C5-3B9C-48EE-BFF0-2E7AF2F2A1F4}" type="slidenum">
+              <a:rPr lang="en-US" smtClean="0"/>
+              <a:pPr/>
+              <a:t>4</a:t>
+            </a:fld>
+            <a:endParaRPr lang="en-US" dirty="0"/>
+          </a:p>
+        </p:txBody>
+      </p:sp>
+    </p:spTree>
+    <p:extLst>
+      <p:ext uri="{BB962C8B-B14F-4D97-AF65-F5344CB8AC3E}">
+        <p14:creationId xmlns:p14="http://schemas.microsoft.com/office/powerpoint/2010/main" val="271585028"/>
       </p:ext>
     </p:extLst>
   </p:cSld>
@@ -4677,7 +4849,7 @@
         </p:nvSpPr>
         <p:spPr>
           <a:xfrm>
-            <a:off x="772585" y="1550221"/>
+            <a:off x="772585" y="1124744"/>
             <a:ext cx="4963375" cy="4746079"/>
           </a:xfrm>
           <a:prstGeom prst="rect">
@@ -4879,7 +5051,7 @@
             </a:pPr>
             <a:r>
               <a:rPr lang="en-GB"/>
-              <a:t>IP: see paper notes</a:t>
+              <a:t>IP: See beamer</a:t>
             </a:r>
           </a:p>
           <a:p>
@@ -4899,7 +5071,7 @@
             </a:pPr>
             <a:r>
               <a:rPr lang="en-GB"/>
-              <a:t>Password: see paper notes</a:t>
+              <a:t>Password: See beamer</a:t>
             </a:r>
           </a:p>
           <a:p>
@@ -4920,20 +5092,58 @@
             </a:r>
           </a:p>
           <a:p>
+            <a:endParaRPr lang="en-GB"/>
+          </a:p>
+          <a:p>
             <a:pPr marL="342900" indent="-342900">
               <a:buFont typeface="Arial" panose="020B0604020202020204" pitchFamily="34" charset="0"/>
               <a:buChar char="•"/>
             </a:pPr>
-            <a:endParaRPr lang="en-GB"/>
-          </a:p>
-          <a:p>
-            <a:pPr marL="342900" indent="-342900">
+            <a:r>
+              <a:rPr lang="en-GB">
+                <a:sym typeface="Wingdings" panose="05000000000000000000" pitchFamily="2" charset="2"/>
+              </a:rPr>
+              <a:t>Execute the following commands:</a:t>
+            </a:r>
+          </a:p>
+          <a:p>
+            <a:pPr marL="608013" lvl="2" indent="-342900">
               <a:buFont typeface="Arial" panose="020B0604020202020204" pitchFamily="34" charset="0"/>
               <a:buChar char="•"/>
             </a:pPr>
             <a:r>
               <a:rPr lang="en-GB"/>
-              <a:t>Open C:\Users\dev\repos\pulumi-structurizr-workshop</a:t>
+              <a:t>cd C:\repos\pulumi-structurizr-workshop</a:t>
+            </a:r>
+          </a:p>
+          <a:p>
+            <a:pPr marL="608013" lvl="2" indent="-342900">
+              <a:buFont typeface="Arial" panose="020B0604020202020204" pitchFamily="34" charset="0"/>
+              <a:buChar char="•"/>
+            </a:pPr>
+            <a:r>
+              <a:rPr lang="en-GB"/>
+              <a:t>Set-ExecutionPolicy RemoteSigned</a:t>
+            </a:r>
+          </a:p>
+          <a:p>
+            <a:pPr marL="608013" lvl="2" indent="-342900">
+              <a:buFont typeface="Arial" panose="020B0604020202020204" pitchFamily="34" charset="0"/>
+              <a:buChar char="•"/>
+            </a:pPr>
+            <a:r>
+              <a:rPr lang="en-GB"/>
+              <a:t> .\scripts\finalize-vm-setup.ps1</a:t>
+            </a:r>
+          </a:p>
+          <a:p>
+            <a:pPr marL="608013" lvl="2" indent="-342900">
+              <a:buFont typeface="Arial" panose="020B0604020202020204" pitchFamily="34" charset="0"/>
+              <a:buChar char="•"/>
+            </a:pPr>
+            <a:r>
+              <a:rPr lang="en-GB"/>
+              <a:t>code .</a:t>
             </a:r>
             <a:endParaRPr lang="en-GB" dirty="0"/>
           </a:p>
@@ -4955,7 +5165,7 @@
         </p:nvSpPr>
         <p:spPr>
           <a:xfrm>
-            <a:off x="6441311" y="1550221"/>
+            <a:off x="6441311" y="1124744"/>
             <a:ext cx="5199304" cy="4746079"/>
           </a:xfrm>
           <a:prstGeom prst="rect">
@@ -5216,7 +5426,7 @@
         </p:nvCxnSpPr>
         <p:spPr>
           <a:xfrm>
-            <a:off x="5879976" y="1550221"/>
+            <a:off x="5879976" y="1124744"/>
             <a:ext cx="0" cy="4903115"/>
           </a:xfrm>
           <a:prstGeom prst="line">
@@ -5243,6 +5453,479 @@
     <p:extLst>
       <p:ext uri="{BB962C8B-B14F-4D97-AF65-F5344CB8AC3E}">
         <p14:creationId xmlns:p14="http://schemas.microsoft.com/office/powerpoint/2010/main" val="1630083521"/>
+      </p:ext>
+    </p:extLst>
+  </p:cSld>
+  <p:clrMapOvr>
+    <a:masterClrMapping/>
+  </p:clrMapOvr>
+</p:sld>
+</file>
+
+<file path=ppt/slides/slide3.xml><?xml version="1.0" encoding="utf-8"?>
+<p:sld xmlns:a="http://schemas.openxmlformats.org/drawingml/2006/main" xmlns:r="http://schemas.openxmlformats.org/officeDocument/2006/relationships" xmlns:p="http://schemas.openxmlformats.org/presentationml/2006/main" show="0">
+  <p:cSld>
+    <p:spTree>
+      <p:nvGrpSpPr>
+        <p:cNvPr id="1" name=""/>
+        <p:cNvGrpSpPr/>
+        <p:nvPr/>
+      </p:nvGrpSpPr>
+      <p:grpSpPr>
+        <a:xfrm>
+          <a:off x="0" y="0"/>
+          <a:ext cx="0" cy="0"/>
+          <a:chOff x="0" y="0"/>
+          <a:chExt cx="0" cy="0"/>
+        </a:xfrm>
+      </p:grpSpPr>
+      <p:sp>
+        <p:nvSpPr>
+          <p:cNvPr id="2" name="Title 1"/>
+          <p:cNvSpPr>
+            <a:spLocks noGrp="1"/>
+          </p:cNvSpPr>
+          <p:nvPr>
+            <p:ph type="title"/>
+          </p:nvPr>
+        </p:nvSpPr>
+        <p:spPr>
+          <a:xfrm>
+            <a:off x="772585" y="220993"/>
+            <a:ext cx="11216216" cy="712892"/>
+          </a:xfrm>
+        </p:spPr>
+        <p:txBody>
+          <a:bodyPr/>
+          <a:lstStyle/>
+          <a:p>
+            <a:r>
+              <a:rPr lang="en-GB"/>
+              <a:t>Infrastructure &amp; architecture as </a:t>
+            </a:r>
+            <a:r>
+              <a:rPr lang="en-GB" b="1" i="1"/>
+              <a:t>code</a:t>
+            </a:r>
+            <a:endParaRPr lang="en-GB" dirty="0"/>
+          </a:p>
+        </p:txBody>
+      </p:sp>
+      <p:sp>
+        <p:nvSpPr>
+          <p:cNvPr id="4" name="Text Placeholder 3"/>
+          <p:cNvSpPr>
+            <a:spLocks noGrp="1"/>
+          </p:cNvSpPr>
+          <p:nvPr>
+            <p:ph type="body" sz="quarter" idx="13"/>
+          </p:nvPr>
+        </p:nvSpPr>
+        <p:spPr>
+          <a:xfrm>
+            <a:off x="772587" y="931919"/>
+            <a:ext cx="10363974" cy="645156"/>
+          </a:xfrm>
+        </p:spPr>
+        <p:txBody>
+          <a:bodyPr/>
+          <a:lstStyle/>
+          <a:p>
+            <a:r>
+              <a:rPr lang="en-GB"/>
+              <a:t>  </a:t>
+            </a:r>
+          </a:p>
+          <a:p>
+            <a:endParaRPr lang="en-GB"/>
+          </a:p>
+          <a:p>
+            <a:endParaRPr lang="en-GB"/>
+          </a:p>
+          <a:p>
+            <a:endParaRPr lang="en-GB"/>
+          </a:p>
+          <a:p>
+            <a:pPr algn="ctr"/>
+            <a:endParaRPr lang="de-DE"/>
+          </a:p>
+          <a:p>
+            <a:pPr algn="ctr"/>
+            <a:endParaRPr lang="de-DE">
+              <a:hlinkClick r:id=""/>
+            </a:endParaRPr>
+          </a:p>
+          <a:p>
+            <a:pPr algn="ctr"/>
+            <a:endParaRPr lang="de-DE">
+              <a:hlinkClick r:id=""/>
+            </a:endParaRPr>
+          </a:p>
+          <a:p>
+            <a:pPr algn="ctr"/>
+            <a:endParaRPr lang="de-DE">
+              <a:hlinkClick r:id=""/>
+            </a:endParaRPr>
+          </a:p>
+          <a:p>
+            <a:pPr algn="ctr"/>
+            <a:endParaRPr lang="de-DE">
+              <a:hlinkClick r:id=""/>
+            </a:endParaRPr>
+          </a:p>
+          <a:p>
+            <a:pPr algn="ctr"/>
+            <a:endParaRPr lang="de-DE">
+              <a:hlinkClick r:id=""/>
+            </a:endParaRPr>
+          </a:p>
+          <a:p>
+            <a:pPr algn="ctr"/>
+            <a:endParaRPr lang="de-DE">
+              <a:hlinkClick r:id=""/>
+            </a:endParaRPr>
+          </a:p>
+          <a:p>
+            <a:pPr algn="ctr"/>
+            <a:r>
+              <a:rPr lang="de-DE">
+                <a:hlinkClick r:id=""/>
+              </a:rPr>
+              <a:t>https://github.com/ChristianEder/pulumi-structurizr-workshop</a:t>
+            </a:r>
+            <a:endParaRPr lang="de-DE"/>
+          </a:p>
+          <a:p>
+            <a:pPr algn="ctr"/>
+            <a:endParaRPr lang="de-DE"/>
+          </a:p>
+          <a:p>
+            <a:endParaRPr lang="en-GB"/>
+          </a:p>
+          <a:p>
+            <a:endParaRPr lang="en-GB"/>
+          </a:p>
+          <a:p>
+            <a:endParaRPr lang="en-GB"/>
+          </a:p>
+          <a:p>
+            <a:endParaRPr lang="en-GB" dirty="0"/>
+          </a:p>
+        </p:txBody>
+      </p:sp>
+      <p:pic>
+        <p:nvPicPr>
+          <p:cNvPr id="1026" name="Picture 2" descr="Vorschau Ihres QR Code">
+            <a:extLst>
+              <a:ext uri="{FF2B5EF4-FFF2-40B4-BE49-F238E27FC236}">
+                <a16:creationId xmlns:a16="http://schemas.microsoft.com/office/drawing/2014/main" id="{8DFCE39A-B150-49FA-A9AD-BA9EEEF7DC88}"/>
+              </a:ext>
+            </a:extLst>
+          </p:cNvPr>
+          <p:cNvPicPr>
+            <a:picLocks noChangeAspect="1" noChangeArrowheads="1"/>
+          </p:cNvPicPr>
+          <p:nvPr/>
+        </p:nvPicPr>
+        <p:blipFill>
+          <a:blip r:embed="rId3">
+            <a:extLst>
+              <a:ext uri="{28A0092B-C50C-407E-A947-70E740481C1C}">
+                <a14:useLocalDpi xmlns:a14="http://schemas.microsoft.com/office/drawing/2010/main" val="0"/>
+              </a:ext>
+            </a:extLst>
+          </a:blip>
+          <a:srcRect/>
+          <a:stretch>
+            <a:fillRect/>
+          </a:stretch>
+        </p:blipFill>
+        <p:spPr bwMode="auto">
+          <a:xfrm>
+            <a:off x="4494595" y="1662442"/>
+            <a:ext cx="2919958" cy="2919958"/>
+          </a:xfrm>
+          <a:prstGeom prst="rect">
+            <a:avLst/>
+          </a:prstGeom>
+          <a:noFill/>
+          <a:extLst>
+            <a:ext uri="{909E8E84-426E-40DD-AFC4-6F175D3DCCD1}">
+              <a14:hiddenFill xmlns:a14="http://schemas.microsoft.com/office/drawing/2010/main">
+                <a:solidFill>
+                  <a:srgbClr val="FFFFFF"/>
+                </a:solidFill>
+              </a14:hiddenFill>
+            </a:ext>
+          </a:extLst>
+        </p:spPr>
+      </p:pic>
+      <p:pic>
+        <p:nvPicPr>
+          <p:cNvPr id="6" name="Picture 2" descr="Bildergebnis fÃ¼r vs code icon">
+            <a:hlinkClick r:id="rId4" action="ppaction://hlinkfile"/>
+            <a:extLst>
+              <a:ext uri="{FF2B5EF4-FFF2-40B4-BE49-F238E27FC236}">
+                <a16:creationId xmlns:a16="http://schemas.microsoft.com/office/drawing/2014/main" id="{358C4C80-D690-467B-AEAB-43A4A2600635}"/>
+              </a:ext>
+            </a:extLst>
+          </p:cNvPr>
+          <p:cNvPicPr>
+            <a:picLocks noChangeAspect="1" noChangeArrowheads="1"/>
+          </p:cNvPicPr>
+          <p:nvPr/>
+        </p:nvPicPr>
+        <p:blipFill>
+          <a:blip r:embed="rId5" cstate="print">
+            <a:extLst>
+              <a:ext uri="{28A0092B-C50C-407E-A947-70E740481C1C}">
+                <a14:useLocalDpi xmlns:a14="http://schemas.microsoft.com/office/drawing/2010/main" val="0"/>
+              </a:ext>
+            </a:extLst>
+          </a:blip>
+          <a:srcRect/>
+          <a:stretch>
+            <a:fillRect/>
+          </a:stretch>
+        </p:blipFill>
+        <p:spPr bwMode="auto">
+          <a:xfrm>
+            <a:off x="9984432" y="2564904"/>
+            <a:ext cx="720080" cy="716880"/>
+          </a:xfrm>
+          <a:prstGeom prst="rect">
+            <a:avLst/>
+          </a:prstGeom>
+          <a:noFill/>
+          <a:extLst>
+            <a:ext uri="{909E8E84-426E-40DD-AFC4-6F175D3DCCD1}">
+              <a14:hiddenFill xmlns:a14="http://schemas.microsoft.com/office/drawing/2010/main">
+                <a:solidFill>
+                  <a:srgbClr val="FFFFFF"/>
+                </a:solidFill>
+              </a14:hiddenFill>
+            </a:ext>
+          </a:extLst>
+        </p:spPr>
+      </p:pic>
+    </p:spTree>
+    <p:extLst>
+      <p:ext uri="{BB962C8B-B14F-4D97-AF65-F5344CB8AC3E}">
+        <p14:creationId xmlns:p14="http://schemas.microsoft.com/office/powerpoint/2010/main" val="1592664547"/>
+      </p:ext>
+    </p:extLst>
+  </p:cSld>
+  <p:clrMapOvr>
+    <a:masterClrMapping/>
+  </p:clrMapOvr>
+</p:sld>
+</file>
+
+<file path=ppt/slides/slide4.xml><?xml version="1.0" encoding="utf-8"?>
+<p:sld xmlns:a="http://schemas.openxmlformats.org/drawingml/2006/main" xmlns:r="http://schemas.openxmlformats.org/officeDocument/2006/relationships" xmlns:p="http://schemas.openxmlformats.org/presentationml/2006/main">
+  <p:cSld>
+    <p:spTree>
+      <p:nvGrpSpPr>
+        <p:cNvPr id="1" name=""/>
+        <p:cNvGrpSpPr/>
+        <p:nvPr/>
+      </p:nvGrpSpPr>
+      <p:grpSpPr>
+        <a:xfrm>
+          <a:off x="0" y="0"/>
+          <a:ext cx="0" cy="0"/>
+          <a:chOff x="0" y="0"/>
+          <a:chExt cx="0" cy="0"/>
+        </a:xfrm>
+      </p:grpSpPr>
+      <p:sp>
+        <p:nvSpPr>
+          <p:cNvPr id="2" name="Title 1"/>
+          <p:cNvSpPr>
+            <a:spLocks noGrp="1"/>
+          </p:cNvSpPr>
+          <p:nvPr>
+            <p:ph type="ctrTitle"/>
+          </p:nvPr>
+        </p:nvSpPr>
+        <p:spPr>
+          <a:xfrm>
+            <a:off x="772584" y="5733256"/>
+            <a:ext cx="11216216" cy="832645"/>
+          </a:xfrm>
+        </p:spPr>
+        <p:txBody>
+          <a:bodyPr/>
+          <a:lstStyle/>
+          <a:p>
+            <a:r>
+              <a:rPr lang="en-GB"/>
+              <a:t>Thank for your feedback</a:t>
+            </a:r>
+            <a:endParaRPr lang="en-GB" dirty="0"/>
+          </a:p>
+        </p:txBody>
+      </p:sp>
+      <p:pic>
+        <p:nvPicPr>
+          <p:cNvPr id="5" name="Picture 4"/>
+          <p:cNvPicPr>
+            <a:picLocks noChangeAspect="1"/>
+          </p:cNvPicPr>
+          <p:nvPr/>
+        </p:nvPicPr>
+        <p:blipFill>
+          <a:blip r:embed="rId3"/>
+          <a:stretch>
+            <a:fillRect/>
+          </a:stretch>
+        </p:blipFill>
+        <p:spPr>
+          <a:xfrm>
+            <a:off x="6528048" y="2060848"/>
+            <a:ext cx="732277" cy="597538"/>
+          </a:xfrm>
+          <a:prstGeom prst="rect">
+            <a:avLst/>
+          </a:prstGeom>
+        </p:spPr>
+      </p:pic>
+      <p:pic>
+        <p:nvPicPr>
+          <p:cNvPr id="6" name="Picture 5"/>
+          <p:cNvPicPr>
+            <a:picLocks noChangeAspect="1"/>
+          </p:cNvPicPr>
+          <p:nvPr/>
+        </p:nvPicPr>
+        <p:blipFill>
+          <a:blip r:embed="rId4"/>
+          <a:stretch>
+            <a:fillRect/>
+          </a:stretch>
+        </p:blipFill>
+        <p:spPr>
+          <a:xfrm>
+            <a:off x="6528049" y="2921941"/>
+            <a:ext cx="738512" cy="720080"/>
+          </a:xfrm>
+          <a:prstGeom prst="rect">
+            <a:avLst/>
+          </a:prstGeom>
+        </p:spPr>
+      </p:pic>
+      <p:sp>
+        <p:nvSpPr>
+          <p:cNvPr id="7" name="TextBox 6"/>
+          <p:cNvSpPr txBox="1"/>
+          <p:nvPr/>
+        </p:nvSpPr>
+        <p:spPr>
+          <a:xfrm>
+            <a:off x="7471250" y="2115788"/>
+            <a:ext cx="1095849" cy="487658"/>
+          </a:xfrm>
+          <a:prstGeom prst="rect">
+            <a:avLst/>
+          </a:prstGeom>
+          <a:noFill/>
+        </p:spPr>
+        <p:txBody>
+          <a:bodyPr wrap="none" rtlCol="0">
+            <a:noAutofit/>
+          </a:bodyPr>
+          <a:lstStyle/>
+          <a:p>
+            <a:pPr algn="ctr"/>
+            <a:r>
+              <a:rPr lang="en-GB" sz="2200" dirty="0">
+                <a:latin typeface="AA Zuehlke" pitchFamily="2" charset="0"/>
+              </a:rPr>
+              <a:t>@_</a:t>
+            </a:r>
+            <a:r>
+              <a:rPr lang="en-GB" dirty="0" err="1">
+                <a:latin typeface="AA Zuehlke" pitchFamily="2" charset="0"/>
+              </a:rPr>
+              <a:t>ceder</a:t>
+            </a:r>
+            <a:endParaRPr lang="en-GB" sz="2200" dirty="0">
+              <a:latin typeface="AA Zuehlke" pitchFamily="2" charset="0"/>
+            </a:endParaRPr>
+          </a:p>
+        </p:txBody>
+      </p:sp>
+      <p:sp>
+        <p:nvSpPr>
+          <p:cNvPr id="8" name="TextBox 7"/>
+          <p:cNvSpPr txBox="1"/>
+          <p:nvPr/>
+        </p:nvSpPr>
+        <p:spPr>
+          <a:xfrm>
+            <a:off x="7496619" y="3088120"/>
+            <a:ext cx="3232473" cy="387722"/>
+          </a:xfrm>
+          <a:prstGeom prst="rect">
+            <a:avLst/>
+          </a:prstGeom>
+          <a:noFill/>
+        </p:spPr>
+        <p:txBody>
+          <a:bodyPr wrap="none" rtlCol="0">
+            <a:noAutofit/>
+          </a:bodyPr>
+          <a:lstStyle/>
+          <a:p>
+            <a:r>
+              <a:rPr lang="en-GB" dirty="0">
+                <a:latin typeface="AA Zuehlke" pitchFamily="2" charset="0"/>
+              </a:rPr>
+              <a:t>https://github.com/ChristianEder</a:t>
+            </a:r>
+          </a:p>
+        </p:txBody>
+      </p:sp>
+      <p:pic>
+        <p:nvPicPr>
+          <p:cNvPr id="4" name="Picture 3" descr="A picture containing crossword, text, piece, black&#10;&#10;Description automatically generated">
+            <a:extLst>
+              <a:ext uri="{FF2B5EF4-FFF2-40B4-BE49-F238E27FC236}">
+                <a16:creationId xmlns:a16="http://schemas.microsoft.com/office/drawing/2014/main" id="{06F20AB7-007D-42E2-A9DF-96CEF232EE25}"/>
+              </a:ext>
+            </a:extLst>
+          </p:cNvPr>
+          <p:cNvPicPr>
+            <a:picLocks noChangeAspect="1"/>
+          </p:cNvPicPr>
+          <p:nvPr/>
+        </p:nvPicPr>
+        <p:blipFill>
+          <a:blip r:embed="rId5">
+            <a:extLst>
+              <a:ext uri="{28A0092B-C50C-407E-A947-70E740481C1C}">
+                <a14:useLocalDpi xmlns:a14="http://schemas.microsoft.com/office/drawing/2010/main" val="0"/>
+              </a:ext>
+            </a:extLst>
+          </a:blip>
+          <a:stretch>
+            <a:fillRect/>
+          </a:stretch>
+        </p:blipFill>
+        <p:spPr>
+          <a:xfrm>
+            <a:off x="772583" y="292098"/>
+            <a:ext cx="5369149" cy="5369149"/>
+          </a:xfrm>
+          <a:prstGeom prst="rect">
+            <a:avLst/>
+          </a:prstGeom>
+        </p:spPr>
+      </p:pic>
+    </p:spTree>
+    <p:extLst>
+      <p:ext uri="{BB962C8B-B14F-4D97-AF65-F5344CB8AC3E}">
+        <p14:creationId xmlns:p14="http://schemas.microsoft.com/office/powerpoint/2010/main" val="1976233324"/>
       </p:ext>
     </p:extLst>
   </p:cSld>

</xml_diff>